<commit_message>
Property : Out-Constraint design
</commit_message>
<xml_diff>
--- a/JitStreamDesigner/@Doc/JitStreamDesigner.pptx
+++ b/JitStreamDesigner/@Doc/JitStreamDesigner.pptx
@@ -9,6 +9,7 @@
     <p:sldId id="259" r:id="rId3"/>
     <p:sldId id="257" r:id="rId4"/>
     <p:sldId id="258" r:id="rId5"/>
+    <p:sldId id="260" r:id="rId6"/>
   </p:sldIdLst>
   <p:sldSz cx="12192000" cy="6858000"/>
   <p:notesSz cx="6858000" cy="9144000"/>
@@ -262,7 +263,7 @@
             <a:fld id="{1586DF71-CD67-4D14-921B-163BF1BB3102}" type="datetimeFigureOut">
               <a:rPr kumimoji="1" lang="ja-JP" altLang="en-US" smtClean="0"/>
               <a:pPr/>
-              <a:t>2019/10/17</a:t>
+              <a:t>2020/1/6</a:t>
             </a:fld>
             <a:endParaRPr kumimoji="1" lang="ja-JP" altLang="en-US"/>
           </a:p>
@@ -290,7 +291,7 @@
             </a:lvl1pPr>
           </a:lstStyle>
           <a:p>
-            <a:endParaRPr kumimoji="1" lang="ja-JP" altLang="en-US" dirty="0"/>
+            <a:endParaRPr kumimoji="1" lang="ja-JP" altLang="en-US"/>
           </a:p>
         </p:txBody>
       </p:sp>
@@ -486,7 +487,7 @@
           <a:p>
             <a:fld id="{1586DF71-CD67-4D14-921B-163BF1BB3102}" type="datetimeFigureOut">
               <a:rPr kumimoji="1" lang="ja-JP" altLang="en-US" smtClean="0"/>
-              <a:t>2019/10/17</a:t>
+              <a:t>2020/1/6</a:t>
             </a:fld>
             <a:endParaRPr kumimoji="1" lang="ja-JP" altLang="en-US"/>
           </a:p>
@@ -680,7 +681,7 @@
           <a:p>
             <a:fld id="{1586DF71-CD67-4D14-921B-163BF1BB3102}" type="datetimeFigureOut">
               <a:rPr kumimoji="1" lang="ja-JP" altLang="en-US" smtClean="0"/>
-              <a:t>2019/10/17</a:t>
+              <a:t>2020/1/6</a:t>
             </a:fld>
             <a:endParaRPr kumimoji="1" lang="ja-JP" altLang="en-US"/>
           </a:p>
@@ -790,7 +791,7 @@
           <a:p>
             <a:fld id="{1586DF71-CD67-4D14-921B-163BF1BB3102}" type="datetimeFigureOut">
               <a:rPr kumimoji="1" lang="ja-JP" altLang="en-US" smtClean="0"/>
-              <a:t>2019/10/17</a:t>
+              <a:t>2020/1/6</a:t>
             </a:fld>
             <a:endParaRPr kumimoji="1" lang="ja-JP" altLang="en-US"/>
           </a:p>
@@ -1024,7 +1025,7 @@
             <a:fld id="{1586DF71-CD67-4D14-921B-163BF1BB3102}" type="datetimeFigureOut">
               <a:rPr lang="ja-JP" altLang="en-US" smtClean="0"/>
               <a:pPr/>
-              <a:t>2019/10/17</a:t>
+              <a:t>2020/1/6</a:t>
             </a:fld>
             <a:endParaRPr lang="ja-JP" altLang="en-US"/>
           </a:p>
@@ -1521,13 +1522,13 @@
           <a:lstStyle/>
           <a:p>
             <a:r>
-              <a:rPr kumimoji="1" lang="en-US" altLang="ja-JP" dirty="0">
+              <a:rPr kumimoji="1" lang="en-US" altLang="ja-JP">
                 <a:latin typeface="Tahoma" panose="020B0604030504040204" pitchFamily="34" charset="0"/>
                 <a:ea typeface="Tahoma" panose="020B0604030504040204" pitchFamily="34" charset="0"/>
               </a:rPr>
               <a:t>JIT Stream designer </a:t>
             </a:r>
-            <a:endParaRPr kumimoji="1" lang="ja-JP" altLang="en-US" dirty="0">
+            <a:endParaRPr kumimoji="1" lang="ja-JP" altLang="en-US">
               <a:latin typeface="Tahoma" panose="020B0604030504040204" pitchFamily="34" charset="0"/>
             </a:endParaRPr>
           </a:p>
@@ -1555,7 +1556,7 @@
           <a:lstStyle/>
           <a:p>
             <a:r>
-              <a:rPr kumimoji="1" lang="en-US" altLang="ja-JP" dirty="0"/>
+              <a:rPr kumimoji="1" lang="en-US" altLang="ja-JP"/>
               <a:t>GUI Design</a:t>
             </a:r>
           </a:p>
@@ -1615,10 +1616,10 @@
           <a:lstStyle/>
           <a:p>
             <a:r>
-              <a:rPr kumimoji="1" lang="en-US" altLang="ja-JP" dirty="0"/>
+              <a:rPr kumimoji="1" lang="en-US" altLang="ja-JP"/>
               <a:t>UI/UX Concept</a:t>
             </a:r>
-            <a:endParaRPr kumimoji="1" lang="ja-JP" altLang="en-US" dirty="0"/>
+            <a:endParaRPr kumimoji="1" lang="ja-JP" altLang="en-US"/>
           </a:p>
         </p:txBody>
       </p:sp>
@@ -1644,56 +1645,56 @@
           <a:lstStyle/>
           <a:p>
             <a:r>
-              <a:rPr lang="en-US" altLang="ja-JP" dirty="0"/>
+              <a:rPr lang="en-US" altLang="ja-JP"/>
               <a:t>Try and Undo</a:t>
             </a:r>
           </a:p>
           <a:p>
             <a:pPr lvl="1"/>
             <a:r>
-              <a:rPr lang="en-US" altLang="ja-JP" dirty="0"/>
+              <a:rPr lang="en-US" altLang="ja-JP"/>
               <a:t>No show dialog box many times</a:t>
             </a:r>
           </a:p>
           <a:p>
             <a:pPr lvl="1"/>
             <a:r>
-              <a:rPr lang="en-US" altLang="ja-JP" dirty="0"/>
+              <a:rPr lang="en-US" altLang="ja-JP"/>
               <a:t>You will see log board what you &amp; application did.</a:t>
             </a:r>
           </a:p>
           <a:p>
             <a:r>
-              <a:rPr kumimoji="1" lang="en-US" altLang="ja-JP" dirty="0"/>
+              <a:rPr kumimoji="1" lang="en-US" altLang="ja-JP"/>
               <a:t>Tablet device support (Tap + Swipe operation)</a:t>
             </a:r>
           </a:p>
           <a:p>
             <a:pPr lvl="1"/>
             <a:r>
-              <a:rPr lang="en-US" altLang="ja-JP" dirty="0"/>
+              <a:rPr lang="en-US" altLang="ja-JP"/>
               <a:t>Not so small control (easy to tap)</a:t>
             </a:r>
-            <a:endParaRPr kumimoji="1" lang="en-US" altLang="ja-JP" dirty="0"/>
-          </a:p>
-          <a:p>
-            <a:r>
-              <a:rPr lang="en-US" altLang="ja-JP" dirty="0"/>
+            <a:endParaRPr kumimoji="1" lang="en-US" altLang="ja-JP"/>
+          </a:p>
+          <a:p>
+            <a:r>
+              <a:rPr lang="en-US" altLang="ja-JP"/>
               <a:t>Desktop pc support (Mouse + keyboard operation)</a:t>
             </a:r>
           </a:p>
           <a:p>
             <a:r>
-              <a:rPr kumimoji="1" lang="en-US" altLang="ja-JP" dirty="0"/>
+              <a:rPr kumimoji="1" lang="en-US" altLang="ja-JP"/>
               <a:t>Multilingual (Main = English, Support Japanese)</a:t>
             </a:r>
           </a:p>
           <a:p>
             <a:r>
-              <a:rPr lang="en-US" altLang="ja-JP" dirty="0"/>
+              <a:rPr lang="en-US" altLang="ja-JP"/>
               <a:t>UWP</a:t>
             </a:r>
-            <a:endParaRPr kumimoji="1" lang="ja-JP" altLang="en-US" dirty="0"/>
+            <a:endParaRPr kumimoji="1" lang="ja-JP" altLang="en-US"/>
           </a:p>
         </p:txBody>
       </p:sp>
@@ -1862,14 +1863,14 @@
           <a:lstStyle/>
           <a:p>
             <a:r>
-              <a:rPr kumimoji="1" lang="en-US" altLang="ja-JP" sz="900" dirty="0">
+              <a:rPr kumimoji="1" lang="en-US" altLang="ja-JP" sz="900">
                 <a:solidFill>
                   <a:schemeClr val="accent1"/>
                 </a:solidFill>
               </a:rPr>
               <a:t>Tool bar icon</a:t>
             </a:r>
-            <a:endParaRPr kumimoji="1" lang="ja-JP" altLang="en-US" sz="900" dirty="0">
+            <a:endParaRPr kumimoji="1" lang="ja-JP" altLang="en-US" sz="900">
               <a:solidFill>
                 <a:schemeClr val="accent1"/>
               </a:solidFill>
@@ -1974,14 +1975,14 @@
           <a:lstStyle/>
           <a:p>
             <a:r>
-              <a:rPr kumimoji="1" lang="en-US" altLang="ja-JP" sz="900" dirty="0">
+              <a:rPr kumimoji="1" lang="en-US" altLang="ja-JP" sz="900">
                 <a:solidFill>
                   <a:schemeClr val="accent1"/>
                 </a:solidFill>
               </a:rPr>
               <a:t>Application log board</a:t>
             </a:r>
-            <a:endParaRPr kumimoji="1" lang="ja-JP" altLang="en-US" sz="900" dirty="0">
+            <a:endParaRPr kumimoji="1" lang="ja-JP" altLang="en-US" sz="900">
               <a:solidFill>
                 <a:schemeClr val="accent1"/>
               </a:solidFill>
@@ -2094,14 +2095,14 @@
           <a:lstStyle/>
           <a:p>
             <a:r>
-              <a:rPr kumimoji="1" lang="en-US" altLang="ja-JP" sz="900" dirty="0">
+              <a:rPr kumimoji="1" lang="en-US" altLang="ja-JP" sz="900">
                 <a:solidFill>
                   <a:schemeClr val="accent1"/>
                 </a:solidFill>
               </a:rPr>
               <a:t>Log filter e:Err,  w:Warning,   i:Information,  d:Debug trace</a:t>
             </a:r>
-            <a:endParaRPr kumimoji="1" lang="ja-JP" altLang="en-US" sz="900" dirty="0">
+            <a:endParaRPr kumimoji="1" lang="ja-JP" altLang="en-US" sz="900">
               <a:solidFill>
                 <a:schemeClr val="accent1"/>
               </a:solidFill>
@@ -2138,14 +2139,14 @@
           <a:lstStyle/>
           <a:p>
             <a:r>
-              <a:rPr kumimoji="1" lang="en-US" altLang="ja-JP" sz="900" dirty="0">
+              <a:rPr kumimoji="1" lang="en-US" altLang="ja-JP" sz="900">
                 <a:solidFill>
                   <a:schemeClr val="accent1"/>
                 </a:solidFill>
               </a:rPr>
               <a:t>Simulation Clock</a:t>
             </a:r>
-            <a:endParaRPr kumimoji="1" lang="ja-JP" altLang="en-US" sz="900" dirty="0">
+            <a:endParaRPr kumimoji="1" lang="ja-JP" altLang="en-US" sz="900">
               <a:solidFill>
                 <a:schemeClr val="accent1"/>
               </a:solidFill>
@@ -2258,14 +2259,14 @@
           <a:lstStyle/>
           <a:p>
             <a:r>
-              <a:rPr kumimoji="1" lang="en-US" altLang="ja-JP" sz="900" dirty="0">
+              <a:rPr kumimoji="1" lang="en-US" altLang="ja-JP" sz="900">
                 <a:solidFill>
                   <a:schemeClr val="accent1"/>
                 </a:solidFill>
               </a:rPr>
               <a:t>Clock control button</a:t>
             </a:r>
-            <a:endParaRPr kumimoji="1" lang="ja-JP" altLang="en-US" sz="900" dirty="0">
+            <a:endParaRPr kumimoji="1" lang="ja-JP" altLang="en-US" sz="900">
               <a:solidFill>
                 <a:schemeClr val="accent1"/>
               </a:solidFill>
@@ -2297,14 +2298,14 @@
           <a:lstStyle/>
           <a:p>
             <a:r>
-              <a:rPr kumimoji="1" lang="ja-JP" altLang="en-US" dirty="0"/>
+              <a:rPr kumimoji="1" lang="ja-JP" altLang="en-US"/>
               <a:t>T</a:t>
             </a:r>
             <a:r>
-              <a:rPr kumimoji="1" lang="en-US" altLang="ja-JP" dirty="0"/>
+              <a:rPr kumimoji="1" lang="en-US" altLang="ja-JP"/>
               <a:t>OP screen</a:t>
             </a:r>
-            <a:endParaRPr kumimoji="1" lang="ja-JP" altLang="en-US" dirty="0"/>
+            <a:endParaRPr kumimoji="1" lang="ja-JP" altLang="en-US"/>
           </a:p>
         </p:txBody>
       </p:sp>
@@ -2374,14 +2375,14 @@
           <a:p>
             <a:pPr algn="r"/>
             <a:r>
-              <a:rPr kumimoji="1" lang="en-US" altLang="ja-JP" sz="900" dirty="0">
+              <a:rPr kumimoji="1" lang="en-US" altLang="ja-JP" sz="900">
                 <a:solidFill>
                   <a:schemeClr val="accent1"/>
                 </a:solidFill>
               </a:rPr>
               <a:t>Hamburger menu</a:t>
             </a:r>
-            <a:endParaRPr kumimoji="1" lang="ja-JP" altLang="en-US" sz="900" dirty="0">
+            <a:endParaRPr kumimoji="1" lang="ja-JP" altLang="en-US" sz="900">
               <a:solidFill>
                 <a:schemeClr val="accent1"/>
               </a:solidFill>
@@ -2645,40 +2646,40 @@
           <a:lstStyle/>
           <a:p>
             <a:r>
-              <a:rPr kumimoji="1" lang="en-US" altLang="ja-JP" dirty="0"/>
+              <a:rPr kumimoji="1" lang="en-US" altLang="ja-JP"/>
               <a:t>“JIT Stream</a:t>
             </a:r>
             <a:r>
-              <a:rPr kumimoji="1" lang="en-US" altLang="ja-JP" baseline="0" dirty="0"/>
+              <a:rPr kumimoji="1" lang="en-US" altLang="ja-JP" baseline="0"/>
               <a:t> class” is a modeling template to design your process.</a:t>
             </a:r>
           </a:p>
           <a:p>
             <a:r>
-              <a:rPr kumimoji="1" lang="en-US" altLang="ja-JP" baseline="0" dirty="0"/>
+              <a:rPr kumimoji="1" lang="en-US" altLang="ja-JP" baseline="0"/>
               <a:t>However, This designer make instance automatically.</a:t>
             </a:r>
           </a:p>
           <a:p>
             <a:pPr lvl="1"/>
             <a:r>
-              <a:rPr kumimoji="1" lang="en-US" altLang="ja-JP" dirty="0"/>
+              <a:rPr kumimoji="1" lang="en-US" altLang="ja-JP"/>
               <a:t>For you can try</a:t>
             </a:r>
             <a:r>
-              <a:rPr kumimoji="1" lang="en-US" altLang="ja-JP" baseline="0" dirty="0"/>
+              <a:rPr kumimoji="1" lang="en-US" altLang="ja-JP" baseline="0"/>
               <a:t> and error work-flow design.</a:t>
             </a:r>
           </a:p>
           <a:p>
             <a:r>
-              <a:rPr lang="en-US" altLang="ja-JP" dirty="0"/>
+              <a:rPr lang="en-US" altLang="ja-JP"/>
               <a:t>This kind of first instance named “Main object”</a:t>
             </a:r>
           </a:p>
           <a:p>
             <a:r>
-              <a:rPr kumimoji="1" lang="en-US" altLang="ja-JP" dirty="0"/>
+              <a:rPr kumimoji="1" lang="en-US" altLang="ja-JP"/>
               <a:t>You can instantiate sub object from the main object.</a:t>
             </a:r>
           </a:p>
@@ -2897,7 +2898,7 @@
           <a:lstStyle/>
           <a:p>
             <a:pPr algn="ctr"/>
-            <a:endParaRPr kumimoji="1" lang="ja-JP" altLang="en-US" dirty="0"/>
+            <a:endParaRPr kumimoji="1" lang="ja-JP" altLang="en-US"/>
           </a:p>
         </p:txBody>
       </p:sp>
@@ -2930,13 +2931,13 @@
           <a:lstStyle/>
           <a:p>
             <a:r>
-              <a:rPr kumimoji="1" lang="en-US" altLang="ja-JP" sz="900" u="sng" dirty="0">
+              <a:rPr kumimoji="1" lang="en-US" altLang="ja-JP" sz="900" u="sng">
                 <a:latin typeface="Arial" panose="020B0604020202020204" pitchFamily="34" charset="0"/>
                 <a:cs typeface="Arial" panose="020B0604020202020204" pitchFamily="34" charset="0"/>
               </a:rPr>
               <a:t>PartsLoadZone</a:t>
             </a:r>
-            <a:endParaRPr kumimoji="1" lang="ja-JP" altLang="en-US" sz="900" u="sng" dirty="0">
+            <a:endParaRPr kumimoji="1" lang="ja-JP" altLang="en-US" sz="900" u="sng">
               <a:latin typeface="Arial" panose="020B0604020202020204" pitchFamily="34" charset="0"/>
               <a:cs typeface="Arial" panose="020B0604020202020204" pitchFamily="34" charset="0"/>
             </a:endParaRPr>
@@ -2972,7 +2973,7 @@
           <a:lstStyle/>
           <a:p>
             <a:r>
-              <a:rPr kumimoji="1" lang="en-US" altLang="ja-JP" sz="900" b="1" dirty="0">
+              <a:rPr kumimoji="1" lang="en-US" altLang="ja-JP" sz="900" b="1">
                 <a:solidFill>
                   <a:schemeClr val="bg1">
                     <a:lumMod val="65000"/>
@@ -2985,7 +2986,7 @@
               </a:rPr>
               <a:t>Jit Stream Classes</a:t>
             </a:r>
-            <a:endParaRPr kumimoji="1" lang="ja-JP" altLang="en-US" sz="900" b="1" dirty="0">
+            <a:endParaRPr kumimoji="1" lang="ja-JP" altLang="en-US" sz="900" b="1">
               <a:solidFill>
                 <a:schemeClr val="bg1">
                   <a:lumMod val="65000"/>
@@ -3053,7 +3054,7 @@
           <a:lstStyle/>
           <a:p>
             <a:pPr algn="ctr"/>
-            <a:endParaRPr kumimoji="1" lang="ja-JP" altLang="en-US" dirty="0"/>
+            <a:endParaRPr kumimoji="1" lang="ja-JP" altLang="en-US"/>
           </a:p>
         </p:txBody>
       </p:sp>
@@ -3086,13 +3087,13 @@
           <a:lstStyle/>
           <a:p>
             <a:r>
-              <a:rPr kumimoji="1" lang="en-US" altLang="ja-JP" sz="900" u="sng" dirty="0">
+              <a:rPr kumimoji="1" lang="en-US" altLang="ja-JP" sz="900" u="sng">
                 <a:latin typeface="Arial" panose="020B0604020202020204" pitchFamily="34" charset="0"/>
                 <a:cs typeface="Arial" panose="020B0604020202020204" pitchFamily="34" charset="0"/>
               </a:rPr>
               <a:t>PartsArrangeZone</a:t>
             </a:r>
-            <a:endParaRPr kumimoji="1" lang="ja-JP" altLang="en-US" sz="900" u="sng" dirty="0">
+            <a:endParaRPr kumimoji="1" lang="ja-JP" altLang="en-US" sz="900" u="sng">
               <a:latin typeface="Arial" panose="020B0604020202020204" pitchFamily="34" charset="0"/>
               <a:cs typeface="Arial" panose="020B0604020202020204" pitchFamily="34" charset="0"/>
             </a:endParaRPr>
@@ -3154,7 +3155,7 @@
           <a:lstStyle/>
           <a:p>
             <a:pPr algn="ctr"/>
-            <a:endParaRPr kumimoji="1" lang="ja-JP" altLang="en-US" dirty="0"/>
+            <a:endParaRPr kumimoji="1" lang="ja-JP" altLang="en-US"/>
           </a:p>
         </p:txBody>
       </p:sp>
@@ -3187,13 +3188,13 @@
           <a:lstStyle/>
           <a:p>
             <a:r>
-              <a:rPr kumimoji="1" lang="en-US" altLang="ja-JP" sz="900" u="sng" dirty="0">
+              <a:rPr kumimoji="1" lang="en-US" altLang="ja-JP" sz="900" u="sng">
                 <a:latin typeface="Arial" panose="020B0604020202020204" pitchFamily="34" charset="0"/>
                 <a:cs typeface="Arial" panose="020B0604020202020204" pitchFamily="34" charset="0"/>
               </a:rPr>
               <a:t>WaitingZone</a:t>
             </a:r>
-            <a:endParaRPr kumimoji="1" lang="ja-JP" altLang="en-US" sz="900" u="sng" dirty="0">
+            <a:endParaRPr kumimoji="1" lang="ja-JP" altLang="en-US" sz="900" u="sng">
               <a:latin typeface="Arial" panose="020B0604020202020204" pitchFamily="34" charset="0"/>
               <a:cs typeface="Arial" panose="020B0604020202020204" pitchFamily="34" charset="0"/>
             </a:endParaRPr>
@@ -3255,7 +3256,7 @@
           <a:lstStyle/>
           <a:p>
             <a:pPr algn="ctr"/>
-            <a:endParaRPr kumimoji="1" lang="ja-JP" altLang="en-US" dirty="0"/>
+            <a:endParaRPr kumimoji="1" lang="ja-JP" altLang="en-US"/>
           </a:p>
         </p:txBody>
       </p:sp>
@@ -3288,13 +3289,13 @@
           <a:lstStyle/>
           <a:p>
             <a:r>
-              <a:rPr kumimoji="1" lang="en-US" altLang="ja-JP" sz="900" u="sng" dirty="0">
+              <a:rPr kumimoji="1" lang="en-US" altLang="ja-JP" sz="900" u="sng">
                 <a:latin typeface="Arial" panose="020B0604020202020204" pitchFamily="34" charset="0"/>
                 <a:cs typeface="Arial" panose="020B0604020202020204" pitchFamily="34" charset="0"/>
               </a:rPr>
               <a:t>InternalDelivery</a:t>
             </a:r>
-            <a:endParaRPr kumimoji="1" lang="ja-JP" altLang="en-US" sz="900" u="sng" dirty="0">
+            <a:endParaRPr kumimoji="1" lang="ja-JP" altLang="en-US" sz="900" u="sng">
               <a:latin typeface="Arial" panose="020B0604020202020204" pitchFamily="34" charset="0"/>
               <a:cs typeface="Arial" panose="020B0604020202020204" pitchFamily="34" charset="0"/>
             </a:endParaRPr>
@@ -3351,7 +3352,7 @@
           <a:lstStyle/>
           <a:p>
             <a:pPr algn="ctr"/>
-            <a:endParaRPr kumimoji="1" lang="ja-JP" altLang="en-US" dirty="0"/>
+            <a:endParaRPr kumimoji="1" lang="ja-JP" altLang="en-US"/>
           </a:p>
         </p:txBody>
       </p:sp>
@@ -3384,13 +3385,13 @@
           <a:lstStyle/>
           <a:p>
             <a:r>
-              <a:rPr kumimoji="1" lang="en-US" altLang="ja-JP" sz="900" u="sng" dirty="0">
+              <a:rPr kumimoji="1" lang="en-US" altLang="ja-JP" sz="900" u="sng">
                 <a:latin typeface="Arial" panose="020B0604020202020204" pitchFamily="34" charset="0"/>
                 <a:cs typeface="Arial" panose="020B0604020202020204" pitchFamily="34" charset="0"/>
               </a:rPr>
               <a:t>MakePartsSet</a:t>
             </a:r>
-            <a:endParaRPr kumimoji="1" lang="ja-JP" altLang="en-US" sz="900" u="sng" dirty="0">
+            <a:endParaRPr kumimoji="1" lang="ja-JP" altLang="en-US" sz="900" u="sng">
               <a:latin typeface="Arial" panose="020B0604020202020204" pitchFamily="34" charset="0"/>
               <a:cs typeface="Arial" panose="020B0604020202020204" pitchFamily="34" charset="0"/>
             </a:endParaRPr>
@@ -3452,7 +3453,7 @@
           <a:lstStyle/>
           <a:p>
             <a:pPr algn="ctr"/>
-            <a:endParaRPr kumimoji="1" lang="ja-JP" altLang="en-US" dirty="0"/>
+            <a:endParaRPr kumimoji="1" lang="ja-JP" altLang="en-US"/>
           </a:p>
         </p:txBody>
       </p:sp>
@@ -3485,13 +3486,13 @@
           <a:lstStyle/>
           <a:p>
             <a:r>
-              <a:rPr kumimoji="1" lang="en-US" altLang="ja-JP" sz="900" u="sng" dirty="0">
+              <a:rPr kumimoji="1" lang="en-US" altLang="ja-JP" sz="900" u="sng">
                 <a:latin typeface="Arial" panose="020B0604020202020204" pitchFamily="34" charset="0"/>
                 <a:cs typeface="Arial" panose="020B0604020202020204" pitchFamily="34" charset="0"/>
               </a:rPr>
               <a:t>LineProcess</a:t>
             </a:r>
-            <a:endParaRPr kumimoji="1" lang="ja-JP" altLang="en-US" sz="900" u="sng" dirty="0">
+            <a:endParaRPr kumimoji="1" lang="ja-JP" altLang="en-US" sz="900" u="sng">
               <a:latin typeface="Arial" panose="020B0604020202020204" pitchFamily="34" charset="0"/>
               <a:cs typeface="Arial" panose="020B0604020202020204" pitchFamily="34" charset="0"/>
             </a:endParaRPr>
@@ -3553,7 +3554,7 @@
           <a:lstStyle/>
           <a:p>
             <a:pPr algn="ctr"/>
-            <a:endParaRPr kumimoji="1" lang="ja-JP" altLang="en-US" dirty="0"/>
+            <a:endParaRPr kumimoji="1" lang="ja-JP" altLang="en-US"/>
           </a:p>
         </p:txBody>
       </p:sp>
@@ -3586,13 +3587,13 @@
           <a:lstStyle/>
           <a:p>
             <a:r>
-              <a:rPr kumimoji="1" lang="en-US" altLang="ja-JP" sz="900" u="sng" dirty="0">
+              <a:rPr kumimoji="1" lang="en-US" altLang="ja-JP" sz="900" u="sng">
                 <a:latin typeface="Arial" panose="020B0604020202020204" pitchFamily="34" charset="0"/>
                 <a:cs typeface="Arial" panose="020B0604020202020204" pitchFamily="34" charset="0"/>
               </a:rPr>
               <a:t>AbnormalLine</a:t>
             </a:r>
-            <a:endParaRPr kumimoji="1" lang="ja-JP" altLang="en-US" sz="900" u="sng" dirty="0">
+            <a:endParaRPr kumimoji="1" lang="ja-JP" altLang="en-US" sz="900" u="sng">
               <a:latin typeface="Arial" panose="020B0604020202020204" pitchFamily="34" charset="0"/>
               <a:cs typeface="Arial" panose="020B0604020202020204" pitchFamily="34" charset="0"/>
             </a:endParaRPr>
@@ -3623,10 +3624,10 @@
           <a:lstStyle/>
           <a:p>
             <a:r>
-              <a:rPr kumimoji="1" lang="en-US" altLang="ja-JP" dirty="0"/>
+              <a:rPr kumimoji="1" lang="en-US" altLang="ja-JP"/>
               <a:t>Jit stream class</a:t>
             </a:r>
-            <a:endParaRPr kumimoji="1" lang="ja-JP" altLang="en-US" dirty="0"/>
+            <a:endParaRPr kumimoji="1" lang="ja-JP" altLang="en-US"/>
           </a:p>
         </p:txBody>
       </p:sp>
@@ -3660,14 +3661,14 @@
           <a:p>
             <a:pPr algn="r"/>
             <a:r>
-              <a:rPr kumimoji="1" lang="en-US" altLang="ja-JP" sz="900" dirty="0">
+              <a:rPr kumimoji="1" lang="en-US" altLang="ja-JP" sz="900">
                 <a:solidFill>
                   <a:schemeClr val="accent1"/>
                 </a:solidFill>
               </a:rPr>
               <a:t>Class tip</a:t>
             </a:r>
-            <a:endParaRPr kumimoji="1" lang="ja-JP" altLang="en-US" sz="900" dirty="0">
+            <a:endParaRPr kumimoji="1" lang="ja-JP" altLang="en-US" sz="900">
               <a:solidFill>
                 <a:schemeClr val="accent1"/>
               </a:solidFill>
@@ -3705,14 +3706,14 @@
           <a:p>
             <a:pPr algn="r"/>
             <a:r>
-              <a:rPr kumimoji="1" lang="en-US" altLang="ja-JP" sz="900" dirty="0">
+              <a:rPr kumimoji="1" lang="en-US" altLang="ja-JP" sz="900">
                 <a:solidFill>
                   <a:schemeClr val="accent1"/>
                 </a:solidFill>
               </a:rPr>
               <a:t>Class ID</a:t>
             </a:r>
-            <a:endParaRPr kumimoji="1" lang="ja-JP" altLang="en-US" sz="900" dirty="0">
+            <a:endParaRPr kumimoji="1" lang="ja-JP" altLang="en-US" sz="900">
               <a:solidFill>
                 <a:schemeClr val="accent1"/>
               </a:solidFill>
@@ -3749,7 +3750,7 @@
           <a:lstStyle/>
           <a:p>
             <a:r>
-              <a:rPr kumimoji="1" lang="en-US" altLang="ja-JP" sz="900" dirty="0">
+              <a:rPr kumimoji="1" lang="en-US" altLang="ja-JP" sz="900">
                 <a:solidFill>
                   <a:schemeClr val="tx1">
                     <a:lumMod val="65000"/>
@@ -3761,7 +3762,7 @@
           </a:p>
           <a:p>
             <a:r>
-              <a:rPr kumimoji="1" lang="en-US" altLang="ja-JP" sz="900" dirty="0">
+              <a:rPr kumimoji="1" lang="en-US" altLang="ja-JP" sz="900">
                 <a:solidFill>
                   <a:schemeClr val="tx1">
                     <a:lumMod val="65000"/>
@@ -3773,7 +3774,7 @@
           </a:p>
           <a:p>
             <a:r>
-              <a:rPr kumimoji="1" lang="en-US" altLang="ja-JP" sz="900" dirty="0">
+              <a:rPr kumimoji="1" lang="en-US" altLang="ja-JP" sz="900">
                 <a:solidFill>
                   <a:schemeClr val="tx1">
                     <a:lumMod val="65000"/>
@@ -3784,7 +3785,7 @@
             </a:r>
           </a:p>
           <a:p>
-            <a:endParaRPr kumimoji="1" lang="ja-JP" altLang="en-US" sz="900" dirty="0">
+            <a:endParaRPr kumimoji="1" lang="ja-JP" altLang="en-US" sz="900">
               <a:solidFill>
                 <a:schemeClr val="tx1">
                   <a:lumMod val="65000"/>
@@ -3870,7 +3871,7 @@
           <a:p>
             <a:pPr algn="r"/>
             <a:r>
-              <a:rPr kumimoji="1" lang="en-US" altLang="ja-JP" sz="900" dirty="0">
+              <a:rPr kumimoji="1" lang="en-US" altLang="ja-JP" sz="900">
                 <a:solidFill>
                   <a:schemeClr val="accent1"/>
                 </a:solidFill>
@@ -3881,7 +3882,7 @@
           <a:p>
             <a:pPr algn="r"/>
             <a:r>
-              <a:rPr kumimoji="1" lang="en-US" altLang="ja-JP" sz="900" dirty="0">
+              <a:rPr kumimoji="1" lang="en-US" altLang="ja-JP" sz="900">
                 <a:solidFill>
                   <a:schemeClr val="accent1"/>
                 </a:solidFill>
@@ -3892,14 +3893,14 @@
           <a:p>
             <a:pPr algn="r"/>
             <a:r>
-              <a:rPr kumimoji="1" lang="en-US" altLang="ja-JP" sz="900" dirty="0">
+              <a:rPr kumimoji="1" lang="en-US" altLang="ja-JP" sz="900">
                 <a:solidFill>
                   <a:schemeClr val="accent1"/>
                 </a:solidFill>
               </a:rPr>
               <a:t>menu</a:t>
             </a:r>
-            <a:endParaRPr kumimoji="1" lang="ja-JP" altLang="en-US" sz="900" dirty="0">
+            <a:endParaRPr kumimoji="1" lang="ja-JP" altLang="en-US" sz="900">
               <a:solidFill>
                 <a:schemeClr val="accent1"/>
               </a:solidFill>
@@ -4215,14 +4216,14 @@
           <a:p>
             <a:pPr algn="r"/>
             <a:r>
-              <a:rPr kumimoji="1" lang="en-US" altLang="ja-JP" sz="900" dirty="0">
+              <a:rPr kumimoji="1" lang="en-US" altLang="ja-JP" sz="900">
                 <a:solidFill>
                   <a:schemeClr val="accent1"/>
                 </a:solidFill>
               </a:rPr>
               <a:t>Current class for try-and-error design</a:t>
             </a:r>
-            <a:endParaRPr kumimoji="1" lang="ja-JP" altLang="en-US" sz="900" dirty="0">
+            <a:endParaRPr kumimoji="1" lang="ja-JP" altLang="en-US" sz="900">
               <a:solidFill>
                 <a:schemeClr val="accent1"/>
               </a:solidFill>
@@ -4349,7 +4350,7 @@
           <a:lstStyle/>
           <a:p>
             <a:r>
-              <a:rPr kumimoji="1" lang="en-US" altLang="ja-JP" sz="900" u="sng" dirty="0">
+              <a:rPr kumimoji="1" lang="en-US" altLang="ja-JP" sz="900" u="sng">
                 <a:solidFill>
                   <a:schemeClr val="bg2"/>
                 </a:solidFill>
@@ -4358,7 +4359,7 @@
               </a:rPr>
               <a:t>MakePartsSet</a:t>
             </a:r>
-            <a:endParaRPr kumimoji="1" lang="ja-JP" altLang="en-US" sz="900" u="sng" dirty="0">
+            <a:endParaRPr kumimoji="1" lang="ja-JP" altLang="en-US" sz="900" u="sng">
               <a:solidFill>
                 <a:schemeClr val="bg2"/>
               </a:solidFill>
@@ -4469,14 +4470,14 @@
           <a:lstStyle/>
           <a:p>
             <a:r>
-              <a:rPr kumimoji="1" lang="en-US" altLang="ja-JP" sz="900" dirty="0">
+              <a:rPr kumimoji="1" lang="en-US" altLang="ja-JP" sz="900">
                 <a:solidFill>
                   <a:schemeClr val="accent1"/>
                 </a:solidFill>
               </a:rPr>
               <a:t>Yellow bar describes JIT Stream Class design mode</a:t>
             </a:r>
-            <a:endParaRPr kumimoji="1" lang="ja-JP" altLang="en-US" sz="900" dirty="0">
+            <a:endParaRPr kumimoji="1" lang="ja-JP" altLang="en-US" sz="900">
               <a:solidFill>
                 <a:schemeClr val="accent1"/>
               </a:solidFill>
@@ -4488,6 +4489,925 @@
     <p:extLst>
       <p:ext uri="{BB962C8B-B14F-4D97-AF65-F5344CB8AC3E}">
         <p14:creationId xmlns:p14="http://schemas.microsoft.com/office/powerpoint/2010/main" val="1575290024"/>
+      </p:ext>
+    </p:extLst>
+  </p:cSld>
+  <p:clrMapOvr>
+    <a:masterClrMapping/>
+  </p:clrMapOvr>
+</p:sld>
+</file>
+
+<file path=ppt/slides/slide5.xml><?xml version="1.0" encoding="utf-8"?>
+<p:sld xmlns:a="http://schemas.openxmlformats.org/drawingml/2006/main" xmlns:r="http://schemas.openxmlformats.org/officeDocument/2006/relationships" xmlns:p="http://schemas.openxmlformats.org/presentationml/2006/main">
+  <p:cSld>
+    <p:spTree>
+      <p:nvGrpSpPr>
+        <p:cNvPr id="1" name=""/>
+        <p:cNvGrpSpPr/>
+        <p:nvPr/>
+      </p:nvGrpSpPr>
+      <p:grpSpPr>
+        <a:xfrm>
+          <a:off x="0" y="0"/>
+          <a:ext cx="0" cy="0"/>
+          <a:chOff x="0" y="0"/>
+          <a:chExt cx="0" cy="0"/>
+        </a:xfrm>
+      </p:grpSpPr>
+      <p:sp>
+        <p:nvSpPr>
+          <p:cNvPr id="6" name="正方形/長方形 5">
+            <a:extLst>
+              <a:ext uri="{FF2B5EF4-FFF2-40B4-BE49-F238E27FC236}">
+                <a16:creationId xmlns:a16="http://schemas.microsoft.com/office/drawing/2014/main" id="{EE117C16-707D-4191-8959-5281896FCCD4}"/>
+              </a:ext>
+            </a:extLst>
+          </p:cNvPr>
+          <p:cNvSpPr/>
+          <p:nvPr/>
+        </p:nvSpPr>
+        <p:spPr>
+          <a:xfrm>
+            <a:off x="731520" y="1558835"/>
+            <a:ext cx="3589400" cy="4302034"/>
+          </a:xfrm>
+          <a:prstGeom prst="rect">
+            <a:avLst/>
+          </a:prstGeom>
+          <a:solidFill>
+            <a:srgbClr val="5597BF">
+              <a:alpha val="29804"/>
+            </a:srgbClr>
+          </a:solidFill>
+          <a:ln w="6350">
+            <a:solidFill>
+              <a:schemeClr val="accent5">
+                <a:lumMod val="20000"/>
+                <a:lumOff val="80000"/>
+              </a:schemeClr>
+            </a:solidFill>
+            <a:prstDash val="dash"/>
+          </a:ln>
+        </p:spPr>
+        <p:style>
+          <a:lnRef idx="2">
+            <a:schemeClr val="accent1">
+              <a:shade val="50000"/>
+            </a:schemeClr>
+          </a:lnRef>
+          <a:fillRef idx="1">
+            <a:schemeClr val="accent1"/>
+          </a:fillRef>
+          <a:effectRef idx="0">
+            <a:schemeClr val="accent1"/>
+          </a:effectRef>
+          <a:fontRef idx="minor">
+            <a:schemeClr val="lt1"/>
+          </a:fontRef>
+        </p:style>
+        <p:txBody>
+          <a:bodyPr rtlCol="0" anchor="ctr"/>
+          <a:lstStyle/>
+          <a:p>
+            <a:pPr algn="ctr"/>
+            <a:endParaRPr kumimoji="1" lang="ja-JP" altLang="en-US"/>
+          </a:p>
+        </p:txBody>
+      </p:sp>
+      <p:sp>
+        <p:nvSpPr>
+          <p:cNvPr id="2" name="タイトル 1">
+            <a:extLst>
+              <a:ext uri="{FF2B5EF4-FFF2-40B4-BE49-F238E27FC236}">
+                <a16:creationId xmlns:a16="http://schemas.microsoft.com/office/drawing/2014/main" id="{1FC99F9C-9ACF-4443-AFAE-59DF2B7A9D06}"/>
+              </a:ext>
+            </a:extLst>
+          </p:cNvPr>
+          <p:cNvSpPr>
+            <a:spLocks noGrp="1"/>
+          </p:cNvSpPr>
+          <p:nvPr>
+            <p:ph type="title"/>
+          </p:nvPr>
+        </p:nvSpPr>
+        <p:spPr/>
+        <p:txBody>
+          <a:bodyPr>
+            <a:normAutofit fontScale="90000"/>
+          </a:bodyPr>
+          <a:lstStyle/>
+          <a:p>
+            <a:r>
+              <a:rPr kumimoji="1" lang="en-US" altLang="ja-JP"/>
+              <a:t>PROPERTIES</a:t>
+            </a:r>
+            <a:r>
+              <a:rPr kumimoji="1" lang="ja-JP" altLang="en-US"/>
+              <a:t> </a:t>
+            </a:r>
+            <a:r>
+              <a:rPr kumimoji="1" lang="en-US" altLang="ja-JP"/>
+              <a:t>CASE</a:t>
+            </a:r>
+            <a:endParaRPr kumimoji="1" lang="ja-JP" altLang="en-US"/>
+          </a:p>
+        </p:txBody>
+      </p:sp>
+      <p:sp>
+        <p:nvSpPr>
+          <p:cNvPr id="3" name="コンテンツ プレースホルダー 2">
+            <a:extLst>
+              <a:ext uri="{FF2B5EF4-FFF2-40B4-BE49-F238E27FC236}">
+                <a16:creationId xmlns:a16="http://schemas.microsoft.com/office/drawing/2014/main" id="{DFB06CEF-3D96-483B-AE8E-6356E905DE6E}"/>
+              </a:ext>
+            </a:extLst>
+          </p:cNvPr>
+          <p:cNvSpPr>
+            <a:spLocks noGrp="1"/>
+          </p:cNvSpPr>
+          <p:nvPr>
+            <p:ph idx="1"/>
+          </p:nvPr>
+        </p:nvSpPr>
+        <p:spPr>
+          <a:xfrm>
+            <a:off x="107977" y="791047"/>
+            <a:ext cx="11965654" cy="462988"/>
+          </a:xfrm>
+        </p:spPr>
+        <p:txBody>
+          <a:bodyPr/>
+          <a:lstStyle/>
+          <a:p>
+            <a:r>
+              <a:rPr kumimoji="1" lang="en-US" altLang="ja-JP"/>
+              <a:t>JIT object property editor</a:t>
+            </a:r>
+            <a:endParaRPr kumimoji="1" lang="ja-JP" altLang="en-US"/>
+          </a:p>
+        </p:txBody>
+      </p:sp>
+      <p:sp>
+        <p:nvSpPr>
+          <p:cNvPr id="4" name="正方形/長方形 3">
+            <a:extLst>
+              <a:ext uri="{FF2B5EF4-FFF2-40B4-BE49-F238E27FC236}">
+                <a16:creationId xmlns:a16="http://schemas.microsoft.com/office/drawing/2014/main" id="{194DAE2C-8955-404D-BAD0-DB3818B2107B}"/>
+              </a:ext>
+            </a:extLst>
+          </p:cNvPr>
+          <p:cNvSpPr/>
+          <p:nvPr/>
+        </p:nvSpPr>
+        <p:spPr>
+          <a:xfrm>
+            <a:off x="801189" y="1602377"/>
+            <a:ext cx="1698171" cy="4214949"/>
+          </a:xfrm>
+          <a:prstGeom prst="rect">
+            <a:avLst/>
+          </a:prstGeom>
+          <a:noFill/>
+          <a:ln w="38100">
+            <a:solidFill>
+              <a:schemeClr val="accent5">
+                <a:lumMod val="20000"/>
+                <a:lumOff val="80000"/>
+              </a:schemeClr>
+            </a:solidFill>
+          </a:ln>
+        </p:spPr>
+        <p:style>
+          <a:lnRef idx="2">
+            <a:schemeClr val="accent1">
+              <a:shade val="50000"/>
+            </a:schemeClr>
+          </a:lnRef>
+          <a:fillRef idx="1">
+            <a:schemeClr val="accent1"/>
+          </a:fillRef>
+          <a:effectRef idx="0">
+            <a:schemeClr val="accent1"/>
+          </a:effectRef>
+          <a:fontRef idx="minor">
+            <a:schemeClr val="lt1"/>
+          </a:fontRef>
+        </p:style>
+        <p:txBody>
+          <a:bodyPr rtlCol="0" anchor="ctr"/>
+          <a:lstStyle/>
+          <a:p>
+            <a:pPr algn="ctr"/>
+            <a:endParaRPr kumimoji="1" lang="ja-JP" altLang="en-US"/>
+          </a:p>
+        </p:txBody>
+      </p:sp>
+      <p:sp>
+        <p:nvSpPr>
+          <p:cNvPr id="5" name="テキスト ボックス 4">
+            <a:extLst>
+              <a:ext uri="{FF2B5EF4-FFF2-40B4-BE49-F238E27FC236}">
+                <a16:creationId xmlns:a16="http://schemas.microsoft.com/office/drawing/2014/main" id="{FD88530B-7BEC-41B7-B4BF-12F116674D8E}"/>
+              </a:ext>
+            </a:extLst>
+          </p:cNvPr>
+          <p:cNvSpPr txBox="1"/>
+          <p:nvPr/>
+        </p:nvSpPr>
+        <p:spPr>
+          <a:xfrm>
+            <a:off x="1117692" y="1602377"/>
+            <a:ext cx="1065163" cy="523220"/>
+          </a:xfrm>
+          <a:prstGeom prst="rect">
+            <a:avLst/>
+          </a:prstGeom>
+          <a:noFill/>
+        </p:spPr>
+        <p:txBody>
+          <a:bodyPr wrap="none" rtlCol="0">
+            <a:spAutoFit/>
+          </a:bodyPr>
+          <a:lstStyle/>
+          <a:p>
+            <a:pPr algn="ctr"/>
+            <a:r>
+              <a:rPr kumimoji="1" lang="en-US" altLang="ja-JP" sz="1400">
+                <a:solidFill>
+                  <a:srgbClr val="FFFF00"/>
+                </a:solidFill>
+              </a:rPr>
+              <a:t>View</a:t>
+            </a:r>
+          </a:p>
+          <a:p>
+            <a:pPr algn="ctr"/>
+            <a:r>
+              <a:rPr kumimoji="1" lang="en-US" altLang="ja-JP" sz="1400" u="sng">
+                <a:solidFill>
+                  <a:srgbClr val="FFFF00"/>
+                </a:solidFill>
+              </a:rPr>
+              <a:t>ScrollView</a:t>
+            </a:r>
+            <a:endParaRPr kumimoji="1" lang="ja-JP" altLang="en-US" sz="1400" u="sng">
+              <a:solidFill>
+                <a:srgbClr val="FFFF00"/>
+              </a:solidFill>
+            </a:endParaRPr>
+          </a:p>
+        </p:txBody>
+      </p:sp>
+      <p:sp>
+        <p:nvSpPr>
+          <p:cNvPr id="7" name="テキスト ボックス 6">
+            <a:extLst>
+              <a:ext uri="{FF2B5EF4-FFF2-40B4-BE49-F238E27FC236}">
+                <a16:creationId xmlns:a16="http://schemas.microsoft.com/office/drawing/2014/main" id="{6D797B7F-FF5D-40A4-A046-AF01D0A4B8A6}"/>
+              </a:ext>
+            </a:extLst>
+          </p:cNvPr>
+          <p:cNvSpPr txBox="1"/>
+          <p:nvPr/>
+        </p:nvSpPr>
+        <p:spPr>
+          <a:xfrm>
+            <a:off x="2719277" y="1602377"/>
+            <a:ext cx="1381725" cy="523220"/>
+          </a:xfrm>
+          <a:prstGeom prst="rect">
+            <a:avLst/>
+          </a:prstGeom>
+          <a:noFill/>
+        </p:spPr>
+        <p:txBody>
+          <a:bodyPr wrap="none" rtlCol="0">
+            <a:spAutoFit/>
+          </a:bodyPr>
+          <a:lstStyle/>
+          <a:p>
+            <a:pPr algn="ctr"/>
+            <a:r>
+              <a:rPr kumimoji="1" lang="en-US" altLang="ja-JP" sz="1400">
+                <a:solidFill>
+                  <a:srgbClr val="FFFF00"/>
+                </a:solidFill>
+              </a:rPr>
+              <a:t>Screen</a:t>
+            </a:r>
+          </a:p>
+          <a:p>
+            <a:pPr algn="ctr"/>
+            <a:r>
+              <a:rPr kumimoji="1" lang="en-US" altLang="ja-JP" sz="1400" u="sng">
+                <a:solidFill>
+                  <a:srgbClr val="FFFF00"/>
+                </a:solidFill>
+              </a:rPr>
+              <a:t>StackPanel (H)</a:t>
+            </a:r>
+            <a:endParaRPr kumimoji="1" lang="ja-JP" altLang="en-US" sz="1400" u="sng">
+              <a:solidFill>
+                <a:srgbClr val="FFFF00"/>
+              </a:solidFill>
+            </a:endParaRPr>
+          </a:p>
+        </p:txBody>
+      </p:sp>
+      <p:sp>
+        <p:nvSpPr>
+          <p:cNvPr id="8" name="テキスト ボックス 7">
+            <a:extLst>
+              <a:ext uri="{FF2B5EF4-FFF2-40B4-BE49-F238E27FC236}">
+                <a16:creationId xmlns:a16="http://schemas.microsoft.com/office/drawing/2014/main" id="{6C61C1CC-3EEE-4BE5-A878-D9230A98E19E}"/>
+              </a:ext>
+            </a:extLst>
+          </p:cNvPr>
+          <p:cNvSpPr txBox="1"/>
+          <p:nvPr/>
+        </p:nvSpPr>
+        <p:spPr>
+          <a:xfrm>
+            <a:off x="923984" y="2301576"/>
+            <a:ext cx="1452577" cy="307777"/>
+          </a:xfrm>
+          <a:prstGeom prst="rect">
+            <a:avLst/>
+          </a:prstGeom>
+          <a:noFill/>
+        </p:spPr>
+        <p:txBody>
+          <a:bodyPr wrap="none" rtlCol="0">
+            <a:spAutoFit/>
+          </a:bodyPr>
+          <a:lstStyle/>
+          <a:p>
+            <a:r>
+              <a:rPr kumimoji="1" lang="en-US" altLang="ja-JP" sz="1400"/>
+              <a:t>To focus screen</a:t>
+            </a:r>
+            <a:endParaRPr kumimoji="1" lang="ja-JP" altLang="en-US" sz="1400"/>
+          </a:p>
+        </p:txBody>
+      </p:sp>
+      <p:sp>
+        <p:nvSpPr>
+          <p:cNvPr id="10" name="正方形/長方形 9">
+            <a:extLst>
+              <a:ext uri="{FF2B5EF4-FFF2-40B4-BE49-F238E27FC236}">
+                <a16:creationId xmlns:a16="http://schemas.microsoft.com/office/drawing/2014/main" id="{2282F58B-1766-4DC0-AA6F-F247993907E9}"/>
+              </a:ext>
+            </a:extLst>
+          </p:cNvPr>
+          <p:cNvSpPr/>
+          <p:nvPr/>
+        </p:nvSpPr>
+        <p:spPr>
+          <a:xfrm>
+            <a:off x="4937760" y="1558835"/>
+            <a:ext cx="3589400" cy="4302034"/>
+          </a:xfrm>
+          <a:prstGeom prst="rect">
+            <a:avLst/>
+          </a:prstGeom>
+          <a:solidFill>
+            <a:srgbClr val="5597BF">
+              <a:alpha val="29804"/>
+            </a:srgbClr>
+          </a:solidFill>
+          <a:ln w="6350">
+            <a:solidFill>
+              <a:schemeClr val="accent5">
+                <a:lumMod val="20000"/>
+                <a:lumOff val="80000"/>
+              </a:schemeClr>
+            </a:solidFill>
+            <a:prstDash val="dash"/>
+          </a:ln>
+        </p:spPr>
+        <p:style>
+          <a:lnRef idx="2">
+            <a:schemeClr val="accent1">
+              <a:shade val="50000"/>
+            </a:schemeClr>
+          </a:lnRef>
+          <a:fillRef idx="1">
+            <a:schemeClr val="accent1"/>
+          </a:fillRef>
+          <a:effectRef idx="0">
+            <a:schemeClr val="accent1"/>
+          </a:effectRef>
+          <a:fontRef idx="minor">
+            <a:schemeClr val="lt1"/>
+          </a:fontRef>
+        </p:style>
+        <p:txBody>
+          <a:bodyPr rtlCol="0" anchor="ctr"/>
+          <a:lstStyle/>
+          <a:p>
+            <a:pPr algn="ctr"/>
+            <a:endParaRPr kumimoji="1" lang="ja-JP" altLang="en-US"/>
+          </a:p>
+        </p:txBody>
+      </p:sp>
+      <p:sp>
+        <p:nvSpPr>
+          <p:cNvPr id="12" name="テキスト ボックス 11">
+            <a:extLst>
+              <a:ext uri="{FF2B5EF4-FFF2-40B4-BE49-F238E27FC236}">
+                <a16:creationId xmlns:a16="http://schemas.microsoft.com/office/drawing/2014/main" id="{190C2DEC-9999-4998-93EF-491090845498}"/>
+              </a:ext>
+            </a:extLst>
+          </p:cNvPr>
+          <p:cNvSpPr txBox="1"/>
+          <p:nvPr/>
+        </p:nvSpPr>
+        <p:spPr>
+          <a:xfrm>
+            <a:off x="4848310" y="1251058"/>
+            <a:ext cx="746422" cy="307777"/>
+          </a:xfrm>
+          <a:prstGeom prst="rect">
+            <a:avLst/>
+          </a:prstGeom>
+          <a:noFill/>
+        </p:spPr>
+        <p:txBody>
+          <a:bodyPr wrap="none" rtlCol="0">
+            <a:spAutoFit/>
+          </a:bodyPr>
+          <a:lstStyle/>
+          <a:p>
+            <a:r>
+              <a:rPr kumimoji="1" lang="en-US" altLang="ja-JP" sz="1400">
+                <a:solidFill>
+                  <a:srgbClr val="FFFF00"/>
+                </a:solidFill>
+              </a:rPr>
+              <a:t>Screen</a:t>
+            </a:r>
+            <a:endParaRPr kumimoji="1" lang="ja-JP" altLang="en-US" sz="1400" u="sng">
+              <a:solidFill>
+                <a:srgbClr val="FFFF00"/>
+              </a:solidFill>
+            </a:endParaRPr>
+          </a:p>
+        </p:txBody>
+      </p:sp>
+      <p:sp>
+        <p:nvSpPr>
+          <p:cNvPr id="13" name="正方形/長方形 12">
+            <a:extLst>
+              <a:ext uri="{FF2B5EF4-FFF2-40B4-BE49-F238E27FC236}">
+                <a16:creationId xmlns:a16="http://schemas.microsoft.com/office/drawing/2014/main" id="{EA0583D7-95E4-45BC-B332-767E52C40331}"/>
+              </a:ext>
+            </a:extLst>
+          </p:cNvPr>
+          <p:cNvSpPr/>
+          <p:nvPr/>
+        </p:nvSpPr>
+        <p:spPr>
+          <a:xfrm>
+            <a:off x="4972591" y="1602376"/>
+            <a:ext cx="1395933" cy="4223657"/>
+          </a:xfrm>
+          <a:prstGeom prst="rect">
+            <a:avLst/>
+          </a:prstGeom>
+          <a:solidFill>
+            <a:srgbClr val="15FF95">
+              <a:alpha val="29804"/>
+            </a:srgbClr>
+          </a:solidFill>
+          <a:ln w="6350">
+            <a:solidFill>
+              <a:schemeClr val="accent5">
+                <a:lumMod val="20000"/>
+                <a:lumOff val="80000"/>
+              </a:schemeClr>
+            </a:solidFill>
+            <a:prstDash val="dash"/>
+          </a:ln>
+        </p:spPr>
+        <p:style>
+          <a:lnRef idx="2">
+            <a:schemeClr val="accent1">
+              <a:shade val="50000"/>
+            </a:schemeClr>
+          </a:lnRef>
+          <a:fillRef idx="1">
+            <a:schemeClr val="accent1"/>
+          </a:fillRef>
+          <a:effectRef idx="0">
+            <a:schemeClr val="accent1"/>
+          </a:effectRef>
+          <a:fontRef idx="minor">
+            <a:schemeClr val="lt1"/>
+          </a:fontRef>
+        </p:style>
+        <p:txBody>
+          <a:bodyPr rtlCol="0" anchor="ctr"/>
+          <a:lstStyle/>
+          <a:p>
+            <a:pPr algn="ctr"/>
+            <a:endParaRPr kumimoji="1" lang="ja-JP" altLang="en-US"/>
+          </a:p>
+        </p:txBody>
+      </p:sp>
+      <p:sp>
+        <p:nvSpPr>
+          <p:cNvPr id="14" name="テキスト ボックス 13">
+            <a:extLst>
+              <a:ext uri="{FF2B5EF4-FFF2-40B4-BE49-F238E27FC236}">
+                <a16:creationId xmlns:a16="http://schemas.microsoft.com/office/drawing/2014/main" id="{60943112-A390-4A8C-85BC-8875DCB2A410}"/>
+              </a:ext>
+            </a:extLst>
+          </p:cNvPr>
+          <p:cNvSpPr txBox="1"/>
+          <p:nvPr/>
+        </p:nvSpPr>
+        <p:spPr>
+          <a:xfrm>
+            <a:off x="4978091" y="1686487"/>
+            <a:ext cx="1381725" cy="523220"/>
+          </a:xfrm>
+          <a:prstGeom prst="rect">
+            <a:avLst/>
+          </a:prstGeom>
+          <a:noFill/>
+        </p:spPr>
+        <p:txBody>
+          <a:bodyPr wrap="none" rtlCol="0">
+            <a:spAutoFit/>
+          </a:bodyPr>
+          <a:lstStyle/>
+          <a:p>
+            <a:r>
+              <a:rPr kumimoji="1" lang="en-US" altLang="ja-JP" sz="1400">
+                <a:solidFill>
+                  <a:srgbClr val="FFFF00"/>
+                </a:solidFill>
+              </a:rPr>
+              <a:t>Level1</a:t>
+            </a:r>
+          </a:p>
+          <a:p>
+            <a:r>
+              <a:rPr kumimoji="1" lang="en-US" altLang="ja-JP" sz="1400" u="sng">
+                <a:solidFill>
+                  <a:srgbClr val="FFFF00"/>
+                </a:solidFill>
+              </a:rPr>
+              <a:t>StackPanel (V)</a:t>
+            </a:r>
+            <a:endParaRPr kumimoji="1" lang="ja-JP" altLang="en-US" sz="1400" u="sng">
+              <a:solidFill>
+                <a:srgbClr val="FFFF00"/>
+              </a:solidFill>
+            </a:endParaRPr>
+          </a:p>
+        </p:txBody>
+      </p:sp>
+      <p:sp>
+        <p:nvSpPr>
+          <p:cNvPr id="15" name="正方形/長方形 14">
+            <a:extLst>
+              <a:ext uri="{FF2B5EF4-FFF2-40B4-BE49-F238E27FC236}">
+                <a16:creationId xmlns:a16="http://schemas.microsoft.com/office/drawing/2014/main" id="{6C9C4847-5D33-4D6D-B3A3-2CFD1FA2B4D9}"/>
+              </a:ext>
+            </a:extLst>
+          </p:cNvPr>
+          <p:cNvSpPr/>
+          <p:nvPr/>
+        </p:nvSpPr>
+        <p:spPr>
+          <a:xfrm>
+            <a:off x="6400798" y="1602376"/>
+            <a:ext cx="1395933" cy="4223657"/>
+          </a:xfrm>
+          <a:prstGeom prst="rect">
+            <a:avLst/>
+          </a:prstGeom>
+          <a:solidFill>
+            <a:srgbClr val="15FF95">
+              <a:alpha val="29804"/>
+            </a:srgbClr>
+          </a:solidFill>
+          <a:ln w="6350">
+            <a:solidFill>
+              <a:schemeClr val="accent5">
+                <a:lumMod val="20000"/>
+                <a:lumOff val="80000"/>
+              </a:schemeClr>
+            </a:solidFill>
+            <a:prstDash val="dash"/>
+          </a:ln>
+        </p:spPr>
+        <p:style>
+          <a:lnRef idx="2">
+            <a:schemeClr val="accent1">
+              <a:shade val="50000"/>
+            </a:schemeClr>
+          </a:lnRef>
+          <a:fillRef idx="1">
+            <a:schemeClr val="accent1"/>
+          </a:fillRef>
+          <a:effectRef idx="0">
+            <a:schemeClr val="accent1"/>
+          </a:effectRef>
+          <a:fontRef idx="minor">
+            <a:schemeClr val="lt1"/>
+          </a:fontRef>
+        </p:style>
+        <p:txBody>
+          <a:bodyPr rtlCol="0" anchor="ctr"/>
+          <a:lstStyle/>
+          <a:p>
+            <a:pPr algn="ctr"/>
+            <a:endParaRPr kumimoji="1" lang="ja-JP" altLang="en-US"/>
+          </a:p>
+        </p:txBody>
+      </p:sp>
+      <p:sp>
+        <p:nvSpPr>
+          <p:cNvPr id="16" name="テキスト ボックス 15">
+            <a:extLst>
+              <a:ext uri="{FF2B5EF4-FFF2-40B4-BE49-F238E27FC236}">
+                <a16:creationId xmlns:a16="http://schemas.microsoft.com/office/drawing/2014/main" id="{E0BD4FD1-617F-419D-B54B-B6B6F03B8D27}"/>
+              </a:ext>
+            </a:extLst>
+          </p:cNvPr>
+          <p:cNvSpPr txBox="1"/>
+          <p:nvPr/>
+        </p:nvSpPr>
+        <p:spPr>
+          <a:xfrm>
+            <a:off x="6406298" y="1686487"/>
+            <a:ext cx="1381725" cy="523220"/>
+          </a:xfrm>
+          <a:prstGeom prst="rect">
+            <a:avLst/>
+          </a:prstGeom>
+          <a:noFill/>
+        </p:spPr>
+        <p:txBody>
+          <a:bodyPr wrap="none" rtlCol="0">
+            <a:spAutoFit/>
+          </a:bodyPr>
+          <a:lstStyle/>
+          <a:p>
+            <a:r>
+              <a:rPr kumimoji="1" lang="en-US" altLang="ja-JP" sz="1400">
+                <a:solidFill>
+                  <a:srgbClr val="FFFF00"/>
+                </a:solidFill>
+              </a:rPr>
+              <a:t>Level2</a:t>
+            </a:r>
+          </a:p>
+          <a:p>
+            <a:r>
+              <a:rPr kumimoji="1" lang="en-US" altLang="ja-JP" sz="1400" u="sng">
+                <a:solidFill>
+                  <a:srgbClr val="FFFF00"/>
+                </a:solidFill>
+              </a:rPr>
+              <a:t>StackPanel (V)</a:t>
+            </a:r>
+            <a:endParaRPr kumimoji="1" lang="ja-JP" altLang="en-US" sz="1400" u="sng">
+              <a:solidFill>
+                <a:srgbClr val="FFFF00"/>
+              </a:solidFill>
+            </a:endParaRPr>
+          </a:p>
+        </p:txBody>
+      </p:sp>
+      <p:sp>
+        <p:nvSpPr>
+          <p:cNvPr id="17" name="テキスト ボックス 16">
+            <a:extLst>
+              <a:ext uri="{FF2B5EF4-FFF2-40B4-BE49-F238E27FC236}">
+                <a16:creationId xmlns:a16="http://schemas.microsoft.com/office/drawing/2014/main" id="{B5AEAD18-4ED0-419E-BC15-758AF5CF12B6}"/>
+              </a:ext>
+            </a:extLst>
+          </p:cNvPr>
+          <p:cNvSpPr txBox="1"/>
+          <p:nvPr/>
+        </p:nvSpPr>
+        <p:spPr>
+          <a:xfrm>
+            <a:off x="7902214" y="3689458"/>
+            <a:ext cx="453970" cy="307777"/>
+          </a:xfrm>
+          <a:prstGeom prst="rect">
+            <a:avLst/>
+          </a:prstGeom>
+          <a:noFill/>
+        </p:spPr>
+        <p:txBody>
+          <a:bodyPr wrap="none" rtlCol="0">
+            <a:spAutoFit/>
+          </a:bodyPr>
+          <a:lstStyle/>
+          <a:p>
+            <a:r>
+              <a:rPr kumimoji="1" lang="ja-JP" altLang="en-US" sz="1400">
+                <a:solidFill>
+                  <a:srgbClr val="FFFF00"/>
+                </a:solidFill>
+              </a:rPr>
+              <a:t>・・・</a:t>
+            </a:r>
+          </a:p>
+        </p:txBody>
+      </p:sp>
+      <p:sp>
+        <p:nvSpPr>
+          <p:cNvPr id="19" name="テキスト ボックス 18">
+            <a:extLst>
+              <a:ext uri="{FF2B5EF4-FFF2-40B4-BE49-F238E27FC236}">
+                <a16:creationId xmlns:a16="http://schemas.microsoft.com/office/drawing/2014/main" id="{AD4B5E17-E9C6-4F39-917D-FBA61FE32F7F}"/>
+              </a:ext>
+            </a:extLst>
+          </p:cNvPr>
+          <p:cNvSpPr txBox="1"/>
+          <p:nvPr/>
+        </p:nvSpPr>
+        <p:spPr>
+          <a:xfrm>
+            <a:off x="5005397" y="3121223"/>
+            <a:ext cx="1275606" cy="307777"/>
+          </a:xfrm>
+          <a:prstGeom prst="rect">
+            <a:avLst/>
+          </a:prstGeom>
+          <a:noFill/>
+        </p:spPr>
+        <p:txBody>
+          <a:bodyPr wrap="none" rtlCol="0">
+            <a:spAutoFit/>
+          </a:bodyPr>
+          <a:lstStyle/>
+          <a:p>
+            <a:r>
+              <a:rPr kumimoji="1" lang="en-US" altLang="ja-JP" sz="1400"/>
+              <a:t>Ex. JitProcess</a:t>
+            </a:r>
+            <a:endParaRPr kumimoji="1" lang="ja-JP" altLang="en-US" sz="1400"/>
+          </a:p>
+        </p:txBody>
+      </p:sp>
+      <p:sp>
+        <p:nvSpPr>
+          <p:cNvPr id="21" name="テキスト ボックス 20">
+            <a:extLst>
+              <a:ext uri="{FF2B5EF4-FFF2-40B4-BE49-F238E27FC236}">
+                <a16:creationId xmlns:a16="http://schemas.microsoft.com/office/drawing/2014/main" id="{D6E3FA1F-DEBD-4AED-8240-80AB9B3059A2}"/>
+              </a:ext>
+            </a:extLst>
+          </p:cNvPr>
+          <p:cNvSpPr txBox="1"/>
+          <p:nvPr/>
+        </p:nvSpPr>
+        <p:spPr>
+          <a:xfrm>
+            <a:off x="6465883" y="3121223"/>
+            <a:ext cx="1122487" cy="307777"/>
+          </a:xfrm>
+          <a:prstGeom prst="rect">
+            <a:avLst/>
+          </a:prstGeom>
+          <a:noFill/>
+        </p:spPr>
+        <p:txBody>
+          <a:bodyPr wrap="none" rtlCol="0">
+            <a:spAutoFit/>
+          </a:bodyPr>
+          <a:lstStyle/>
+          <a:p>
+            <a:r>
+              <a:rPr kumimoji="1" lang="en-US" altLang="ja-JP" sz="1400"/>
+              <a:t>Ex. CoSpan</a:t>
+            </a:r>
+            <a:endParaRPr kumimoji="1" lang="ja-JP" altLang="en-US" sz="1400"/>
+          </a:p>
+        </p:txBody>
+      </p:sp>
+      <p:sp>
+        <p:nvSpPr>
+          <p:cNvPr id="22" name="矢印: 右 21">
+            <a:extLst>
+              <a:ext uri="{FF2B5EF4-FFF2-40B4-BE49-F238E27FC236}">
+                <a16:creationId xmlns:a16="http://schemas.microsoft.com/office/drawing/2014/main" id="{99AA67C2-32AE-4378-898A-184D56AE973E}"/>
+              </a:ext>
+            </a:extLst>
+          </p:cNvPr>
+          <p:cNvSpPr/>
+          <p:nvPr/>
+        </p:nvSpPr>
+        <p:spPr>
+          <a:xfrm>
+            <a:off x="2498812" y="5537067"/>
+            <a:ext cx="209006" cy="274528"/>
+          </a:xfrm>
+          <a:prstGeom prst="rightArrow">
+            <a:avLst/>
+          </a:prstGeom>
+          <a:noFill/>
+          <a:ln>
+            <a:solidFill>
+              <a:schemeClr val="accent5">
+                <a:lumMod val="20000"/>
+                <a:lumOff val="80000"/>
+              </a:schemeClr>
+            </a:solidFill>
+          </a:ln>
+        </p:spPr>
+        <p:style>
+          <a:lnRef idx="2">
+            <a:schemeClr val="accent1">
+              <a:shade val="50000"/>
+            </a:schemeClr>
+          </a:lnRef>
+          <a:fillRef idx="1">
+            <a:schemeClr val="accent1"/>
+          </a:fillRef>
+          <a:effectRef idx="0">
+            <a:schemeClr val="accent1"/>
+          </a:effectRef>
+          <a:fontRef idx="minor">
+            <a:schemeClr val="lt1"/>
+          </a:fontRef>
+        </p:style>
+        <p:txBody>
+          <a:bodyPr rtlCol="0" anchor="ctr"/>
+          <a:lstStyle/>
+          <a:p>
+            <a:pPr algn="ctr"/>
+            <a:endParaRPr kumimoji="1" lang="ja-JP" altLang="en-US"/>
+          </a:p>
+        </p:txBody>
+      </p:sp>
+      <p:sp>
+        <p:nvSpPr>
+          <p:cNvPr id="24" name="矢印: 右 23">
+            <a:extLst>
+              <a:ext uri="{FF2B5EF4-FFF2-40B4-BE49-F238E27FC236}">
+                <a16:creationId xmlns:a16="http://schemas.microsoft.com/office/drawing/2014/main" id="{5D48F0C8-3270-4870-A183-F52C6C4F9915}"/>
+              </a:ext>
+            </a:extLst>
+          </p:cNvPr>
+          <p:cNvSpPr/>
+          <p:nvPr/>
+        </p:nvSpPr>
+        <p:spPr>
+          <a:xfrm rot="10800000">
+            <a:off x="589984" y="5537067"/>
+            <a:ext cx="209006" cy="274528"/>
+          </a:xfrm>
+          <a:prstGeom prst="rightArrow">
+            <a:avLst/>
+          </a:prstGeom>
+          <a:noFill/>
+          <a:ln>
+            <a:solidFill>
+              <a:schemeClr val="accent5">
+                <a:lumMod val="20000"/>
+                <a:lumOff val="80000"/>
+              </a:schemeClr>
+            </a:solidFill>
+          </a:ln>
+        </p:spPr>
+        <p:style>
+          <a:lnRef idx="2">
+            <a:schemeClr val="accent1">
+              <a:shade val="50000"/>
+            </a:schemeClr>
+          </a:lnRef>
+          <a:fillRef idx="1">
+            <a:schemeClr val="accent1"/>
+          </a:fillRef>
+          <a:effectRef idx="0">
+            <a:schemeClr val="accent1"/>
+          </a:effectRef>
+          <a:fontRef idx="minor">
+            <a:schemeClr val="lt1"/>
+          </a:fontRef>
+        </p:style>
+        <p:txBody>
+          <a:bodyPr rtlCol="0" anchor="ctr"/>
+          <a:lstStyle/>
+          <a:p>
+            <a:pPr algn="ctr"/>
+            <a:endParaRPr kumimoji="1" lang="ja-JP" altLang="en-US"/>
+          </a:p>
+        </p:txBody>
+      </p:sp>
+    </p:spTree>
+    <p:extLst>
+      <p:ext uri="{BB962C8B-B14F-4D97-AF65-F5344CB8AC3E}">
+        <p14:creationId xmlns:p14="http://schemas.microsoft.com/office/powerpoint/2010/main" val="722223438"/>
       </p:ext>
     </p:extLst>
   </p:cSld>

</xml_diff>